<commit_message>
add rbd to fig 3
</commit_message>
<xml_diff>
--- a/manuscript/revised_fig_components/figure2.pptx
+++ b/manuscript/revised_fig_components/figure2.pptx
@@ -243,7 +243,7 @@
           <a:p>
             <a:fld id="{58749126-4A29-7841-A2CD-BCBFE668F1B2}" type="datetimeFigureOut">
               <a:rPr lang="en-US" smtClean="0"/>
-              <a:t>12/18/20</a:t>
+              <a:t>12/29/20</a:t>
             </a:fld>
             <a:endParaRPr lang="en-US"/>
           </a:p>
@@ -413,7 +413,7 @@
           <a:p>
             <a:fld id="{58749126-4A29-7841-A2CD-BCBFE668F1B2}" type="datetimeFigureOut">
               <a:rPr lang="en-US" smtClean="0"/>
-              <a:t>12/18/20</a:t>
+              <a:t>12/29/20</a:t>
             </a:fld>
             <a:endParaRPr lang="en-US"/>
           </a:p>
@@ -593,7 +593,7 @@
           <a:p>
             <a:fld id="{58749126-4A29-7841-A2CD-BCBFE668F1B2}" type="datetimeFigureOut">
               <a:rPr lang="en-US" smtClean="0"/>
-              <a:t>12/18/20</a:t>
+              <a:t>12/29/20</a:t>
             </a:fld>
             <a:endParaRPr lang="en-US"/>
           </a:p>
@@ -763,7 +763,7 @@
           <a:p>
             <a:fld id="{58749126-4A29-7841-A2CD-BCBFE668F1B2}" type="datetimeFigureOut">
               <a:rPr lang="en-US" smtClean="0"/>
-              <a:t>12/18/20</a:t>
+              <a:t>12/29/20</a:t>
             </a:fld>
             <a:endParaRPr lang="en-US"/>
           </a:p>
@@ -1009,7 +1009,7 @@
           <a:p>
             <a:fld id="{58749126-4A29-7841-A2CD-BCBFE668F1B2}" type="datetimeFigureOut">
               <a:rPr lang="en-US" smtClean="0"/>
-              <a:t>12/18/20</a:t>
+              <a:t>12/29/20</a:t>
             </a:fld>
             <a:endParaRPr lang="en-US"/>
           </a:p>
@@ -1241,7 +1241,7 @@
           <a:p>
             <a:fld id="{58749126-4A29-7841-A2CD-BCBFE668F1B2}" type="datetimeFigureOut">
               <a:rPr lang="en-US" smtClean="0"/>
-              <a:t>12/18/20</a:t>
+              <a:t>12/29/20</a:t>
             </a:fld>
             <a:endParaRPr lang="en-US"/>
           </a:p>
@@ -1608,7 +1608,7 @@
           <a:p>
             <a:fld id="{58749126-4A29-7841-A2CD-BCBFE668F1B2}" type="datetimeFigureOut">
               <a:rPr lang="en-US" smtClean="0"/>
-              <a:t>12/18/20</a:t>
+              <a:t>12/29/20</a:t>
             </a:fld>
             <a:endParaRPr lang="en-US"/>
           </a:p>
@@ -1726,7 +1726,7 @@
           <a:p>
             <a:fld id="{58749126-4A29-7841-A2CD-BCBFE668F1B2}" type="datetimeFigureOut">
               <a:rPr lang="en-US" smtClean="0"/>
-              <a:t>12/18/20</a:t>
+              <a:t>12/29/20</a:t>
             </a:fld>
             <a:endParaRPr lang="en-US"/>
           </a:p>
@@ -1821,7 +1821,7 @@
           <a:p>
             <a:fld id="{58749126-4A29-7841-A2CD-BCBFE668F1B2}" type="datetimeFigureOut">
               <a:rPr lang="en-US" smtClean="0"/>
-              <a:t>12/18/20</a:t>
+              <a:t>12/29/20</a:t>
             </a:fld>
             <a:endParaRPr lang="en-US"/>
           </a:p>
@@ -2098,7 +2098,7 @@
           <a:p>
             <a:fld id="{58749126-4A29-7841-A2CD-BCBFE668F1B2}" type="datetimeFigureOut">
               <a:rPr lang="en-US" smtClean="0"/>
-              <a:t>12/18/20</a:t>
+              <a:t>12/29/20</a:t>
             </a:fld>
             <a:endParaRPr lang="en-US"/>
           </a:p>
@@ -2355,7 +2355,7 @@
           <a:p>
             <a:fld id="{58749126-4A29-7841-A2CD-BCBFE668F1B2}" type="datetimeFigureOut">
               <a:rPr lang="en-US" smtClean="0"/>
-              <a:t>12/18/20</a:t>
+              <a:t>12/29/20</a:t>
             </a:fld>
             <a:endParaRPr lang="en-US"/>
           </a:p>
@@ -2568,7 +2568,7 @@
           <a:p>
             <a:fld id="{58749126-4A29-7841-A2CD-BCBFE668F1B2}" type="datetimeFigureOut">
               <a:rPr lang="en-US" smtClean="0"/>
-              <a:t>12/18/20</a:t>
+              <a:t>12/29/20</a:t>
             </a:fld>
             <a:endParaRPr lang="en-US"/>
           </a:p>
@@ -4681,6 +4681,261 @@
           </a:p>
         </p:txBody>
       </p:sp>
+      <p:cxnSp>
+        <p:nvCxnSpPr>
+          <p:cNvPr id="7" name="Straight Connector 6">
+            <a:extLst>
+              <a:ext uri="{FF2B5EF4-FFF2-40B4-BE49-F238E27FC236}">
+                <a16:creationId xmlns:a16="http://schemas.microsoft.com/office/drawing/2014/main" id="{2AD29F9A-7534-8D44-995D-228D4C9F2170}"/>
+              </a:ext>
+            </a:extLst>
+          </p:cNvPr>
+          <p:cNvCxnSpPr>
+            <a:cxnSpLocks/>
+          </p:cNvCxnSpPr>
+          <p:nvPr/>
+        </p:nvCxnSpPr>
+        <p:spPr>
+          <a:xfrm>
+            <a:off x="2743200" y="513893"/>
+            <a:ext cx="1124712" cy="0"/>
+          </a:xfrm>
+          <a:prstGeom prst="line">
+            <a:avLst/>
+          </a:prstGeom>
+          <a:ln w="38100">
+            <a:solidFill>
+              <a:srgbClr val="F7C446">
+                <a:alpha val="35000"/>
+              </a:srgbClr>
+            </a:solidFill>
+          </a:ln>
+        </p:spPr>
+        <p:style>
+          <a:lnRef idx="1">
+            <a:schemeClr val="accent1"/>
+          </a:lnRef>
+          <a:fillRef idx="0">
+            <a:schemeClr val="accent1"/>
+          </a:fillRef>
+          <a:effectRef idx="0">
+            <a:schemeClr val="accent1"/>
+          </a:effectRef>
+          <a:fontRef idx="minor">
+            <a:schemeClr val="tx1"/>
+          </a:fontRef>
+        </p:style>
+      </p:cxnSp>
+      <p:cxnSp>
+        <p:nvCxnSpPr>
+          <p:cNvPr id="46" name="Straight Connector 45">
+            <a:extLst>
+              <a:ext uri="{FF2B5EF4-FFF2-40B4-BE49-F238E27FC236}">
+                <a16:creationId xmlns:a16="http://schemas.microsoft.com/office/drawing/2014/main" id="{7B19D13F-2E24-244E-96E1-E40C9EB0648B}"/>
+              </a:ext>
+            </a:extLst>
+          </p:cNvPr>
+          <p:cNvCxnSpPr>
+            <a:cxnSpLocks/>
+          </p:cNvCxnSpPr>
+          <p:nvPr/>
+        </p:nvCxnSpPr>
+        <p:spPr>
+          <a:xfrm>
+            <a:off x="2743200" y="2549921"/>
+            <a:ext cx="1124712" cy="0"/>
+          </a:xfrm>
+          <a:prstGeom prst="line">
+            <a:avLst/>
+          </a:prstGeom>
+          <a:ln w="38100">
+            <a:solidFill>
+              <a:srgbClr val="F7C446">
+                <a:alpha val="35000"/>
+              </a:srgbClr>
+            </a:solidFill>
+          </a:ln>
+        </p:spPr>
+        <p:style>
+          <a:lnRef idx="1">
+            <a:schemeClr val="accent1"/>
+          </a:lnRef>
+          <a:fillRef idx="0">
+            <a:schemeClr val="accent1"/>
+          </a:fillRef>
+          <a:effectRef idx="0">
+            <a:schemeClr val="accent1"/>
+          </a:effectRef>
+          <a:fontRef idx="minor">
+            <a:schemeClr val="tx1"/>
+          </a:fontRef>
+        </p:style>
+      </p:cxnSp>
+      <p:cxnSp>
+        <p:nvCxnSpPr>
+          <p:cNvPr id="47" name="Straight Connector 46">
+            <a:extLst>
+              <a:ext uri="{FF2B5EF4-FFF2-40B4-BE49-F238E27FC236}">
+                <a16:creationId xmlns:a16="http://schemas.microsoft.com/office/drawing/2014/main" id="{69197F8D-68EB-1140-87D9-DD97C323C569}"/>
+              </a:ext>
+            </a:extLst>
+          </p:cNvPr>
+          <p:cNvCxnSpPr>
+            <a:cxnSpLocks/>
+          </p:cNvCxnSpPr>
+          <p:nvPr/>
+        </p:nvCxnSpPr>
+        <p:spPr>
+          <a:xfrm>
+            <a:off x="2728334" y="4599435"/>
+            <a:ext cx="758952" cy="0"/>
+          </a:xfrm>
+          <a:prstGeom prst="line">
+            <a:avLst/>
+          </a:prstGeom>
+          <a:ln w="38100">
+            <a:solidFill>
+              <a:srgbClr val="F7C446">
+                <a:alpha val="35000"/>
+              </a:srgbClr>
+            </a:solidFill>
+          </a:ln>
+        </p:spPr>
+        <p:style>
+          <a:lnRef idx="1">
+            <a:schemeClr val="accent1"/>
+          </a:lnRef>
+          <a:fillRef idx="0">
+            <a:schemeClr val="accent1"/>
+          </a:fillRef>
+          <a:effectRef idx="0">
+            <a:schemeClr val="accent1"/>
+          </a:effectRef>
+          <a:fontRef idx="minor">
+            <a:schemeClr val="tx1"/>
+          </a:fontRef>
+        </p:style>
+      </p:cxnSp>
+      <p:sp>
+        <p:nvSpPr>
+          <p:cNvPr id="53" name="Rectangle 52">
+            <a:extLst>
+              <a:ext uri="{FF2B5EF4-FFF2-40B4-BE49-F238E27FC236}">
+                <a16:creationId xmlns:a16="http://schemas.microsoft.com/office/drawing/2014/main" id="{9923A84D-AEC0-FF45-97FD-6201C9F98CFF}"/>
+              </a:ext>
+            </a:extLst>
+          </p:cNvPr>
+          <p:cNvSpPr/>
+          <p:nvPr/>
+        </p:nvSpPr>
+        <p:spPr>
+          <a:xfrm>
+            <a:off x="2670938" y="4361755"/>
+            <a:ext cx="455574" cy="246221"/>
+          </a:xfrm>
+          <a:prstGeom prst="rect">
+            <a:avLst/>
+          </a:prstGeom>
+        </p:spPr>
+        <p:txBody>
+          <a:bodyPr wrap="none">
+            <a:spAutoFit/>
+          </a:bodyPr>
+          <a:lstStyle/>
+          <a:p>
+            <a:r>
+              <a:rPr lang="en-US" sz="1000" dirty="0">
+                <a:solidFill>
+                  <a:srgbClr val="F7C446"/>
+                </a:solidFill>
+                <a:latin typeface="Arial" panose="020B0604020202020204" pitchFamily="34" charset="0"/>
+                <a:cs typeface="Arial" panose="020B0604020202020204" pitchFamily="34" charset="0"/>
+              </a:rPr>
+              <a:t>RBD</a:t>
+            </a:r>
+          </a:p>
+        </p:txBody>
+      </p:sp>
+      <p:sp>
+        <p:nvSpPr>
+          <p:cNvPr id="54" name="Rectangle 53">
+            <a:extLst>
+              <a:ext uri="{FF2B5EF4-FFF2-40B4-BE49-F238E27FC236}">
+                <a16:creationId xmlns:a16="http://schemas.microsoft.com/office/drawing/2014/main" id="{6235F15E-6349-9A4F-A902-9DDDFBB6F6C4}"/>
+              </a:ext>
+            </a:extLst>
+          </p:cNvPr>
+          <p:cNvSpPr/>
+          <p:nvPr/>
+        </p:nvSpPr>
+        <p:spPr>
+          <a:xfrm>
+            <a:off x="2663499" y="2320611"/>
+            <a:ext cx="455574" cy="246221"/>
+          </a:xfrm>
+          <a:prstGeom prst="rect">
+            <a:avLst/>
+          </a:prstGeom>
+        </p:spPr>
+        <p:txBody>
+          <a:bodyPr wrap="none">
+            <a:spAutoFit/>
+          </a:bodyPr>
+          <a:lstStyle/>
+          <a:p>
+            <a:r>
+              <a:rPr lang="en-US" sz="1000" dirty="0">
+                <a:solidFill>
+                  <a:srgbClr val="F7C446"/>
+                </a:solidFill>
+                <a:latin typeface="Arial" panose="020B0604020202020204" pitchFamily="34" charset="0"/>
+                <a:cs typeface="Arial" panose="020B0604020202020204" pitchFamily="34" charset="0"/>
+              </a:rPr>
+              <a:t>RBD</a:t>
+            </a:r>
+          </a:p>
+        </p:txBody>
+      </p:sp>
+      <p:sp>
+        <p:nvSpPr>
+          <p:cNvPr id="55" name="Rectangle 54">
+            <a:extLst>
+              <a:ext uri="{FF2B5EF4-FFF2-40B4-BE49-F238E27FC236}">
+                <a16:creationId xmlns:a16="http://schemas.microsoft.com/office/drawing/2014/main" id="{51A8CC14-CFE1-9949-ACB7-1A5EFE5A323C}"/>
+              </a:ext>
+            </a:extLst>
+          </p:cNvPr>
+          <p:cNvSpPr/>
+          <p:nvPr/>
+        </p:nvSpPr>
+        <p:spPr>
+          <a:xfrm>
+            <a:off x="2670937" y="277735"/>
+            <a:ext cx="455574" cy="246221"/>
+          </a:xfrm>
+          <a:prstGeom prst="rect">
+            <a:avLst/>
+          </a:prstGeom>
+        </p:spPr>
+        <p:txBody>
+          <a:bodyPr wrap="none">
+            <a:spAutoFit/>
+          </a:bodyPr>
+          <a:lstStyle/>
+          <a:p>
+            <a:r>
+              <a:rPr lang="en-US" sz="1000" dirty="0">
+                <a:solidFill>
+                  <a:srgbClr val="F7C446"/>
+                </a:solidFill>
+                <a:latin typeface="Arial" panose="020B0604020202020204" pitchFamily="34" charset="0"/>
+                <a:cs typeface="Arial" panose="020B0604020202020204" pitchFamily="34" charset="0"/>
+              </a:rPr>
+              <a:t>RBD</a:t>
+            </a:r>
+          </a:p>
+        </p:txBody>
+      </p:sp>
     </p:spTree>
     <p:extLst>
       <p:ext uri="{BB962C8B-B14F-4D97-AF65-F5344CB8AC3E}">

</xml_diff>